<commit_message>
no need for space preserve in pptx
</commit_message>
<xml_diff>
--- a/examples/example-href.pptx
+++ b/examples/example-href.pptx
@@ -244,7 +244,7 @@
           <a:p>
             <a:fld id="{2CF66E09-8DBA-E54C-9FBD-9D43ED9CCED6}" type="datetimeFigureOut">
               <a:rPr lang="en-US" smtClean="0"/>
-              <a:t>10/10/16</a:t>
+              <a:t>11/10/16</a:t>
             </a:fld>
             <a:endParaRPr lang="en-US"/>
           </a:p>
@@ -286,7 +286,7 @@
           <a:p>
             <a:fld id="{535055C3-FD5C-1945-A94F-F8DDC84A823B}" type="slidenum">
               <a:rPr lang="en-US" smtClean="0"/>
-              <a:t>‹#›</a:t>
+              <a:t>‹Nr.›</a:t>
             </a:fld>
             <a:endParaRPr lang="en-US"/>
           </a:p>
@@ -414,7 +414,7 @@
           <a:p>
             <a:fld id="{2CF66E09-8DBA-E54C-9FBD-9D43ED9CCED6}" type="datetimeFigureOut">
               <a:rPr lang="en-US" smtClean="0"/>
-              <a:t>10/10/16</a:t>
+              <a:t>11/10/16</a:t>
             </a:fld>
             <a:endParaRPr lang="en-US"/>
           </a:p>
@@ -456,7 +456,7 @@
           <a:p>
             <a:fld id="{535055C3-FD5C-1945-A94F-F8DDC84A823B}" type="slidenum">
               <a:rPr lang="en-US" smtClean="0"/>
-              <a:t>‹#›</a:t>
+              <a:t>‹Nr.›</a:t>
             </a:fld>
             <a:endParaRPr lang="en-US"/>
           </a:p>
@@ -594,7 +594,7 @@
           <a:p>
             <a:fld id="{2CF66E09-8DBA-E54C-9FBD-9D43ED9CCED6}" type="datetimeFigureOut">
               <a:rPr lang="en-US" smtClean="0"/>
-              <a:t>10/10/16</a:t>
+              <a:t>11/10/16</a:t>
             </a:fld>
             <a:endParaRPr lang="en-US"/>
           </a:p>
@@ -636,7 +636,7 @@
           <a:p>
             <a:fld id="{535055C3-FD5C-1945-A94F-F8DDC84A823B}" type="slidenum">
               <a:rPr lang="en-US" smtClean="0"/>
-              <a:t>‹#›</a:t>
+              <a:t>‹Nr.›</a:t>
             </a:fld>
             <a:endParaRPr lang="en-US"/>
           </a:p>
@@ -764,7 +764,7 @@
           <a:p>
             <a:fld id="{2CF66E09-8DBA-E54C-9FBD-9D43ED9CCED6}" type="datetimeFigureOut">
               <a:rPr lang="en-US" smtClean="0"/>
-              <a:t>10/10/16</a:t>
+              <a:t>11/10/16</a:t>
             </a:fld>
             <a:endParaRPr lang="en-US"/>
           </a:p>
@@ -806,7 +806,7 @@
           <a:p>
             <a:fld id="{535055C3-FD5C-1945-A94F-F8DDC84A823B}" type="slidenum">
               <a:rPr lang="en-US" smtClean="0"/>
-              <a:t>‹#›</a:t>
+              <a:t>‹Nr.›</a:t>
             </a:fld>
             <a:endParaRPr lang="en-US"/>
           </a:p>
@@ -1010,7 +1010,7 @@
           <a:p>
             <a:fld id="{2CF66E09-8DBA-E54C-9FBD-9D43ED9CCED6}" type="datetimeFigureOut">
               <a:rPr lang="en-US" smtClean="0"/>
-              <a:t>10/10/16</a:t>
+              <a:t>11/10/16</a:t>
             </a:fld>
             <a:endParaRPr lang="en-US"/>
           </a:p>
@@ -1052,7 +1052,7 @@
           <a:p>
             <a:fld id="{535055C3-FD5C-1945-A94F-F8DDC84A823B}" type="slidenum">
               <a:rPr lang="en-US" smtClean="0"/>
-              <a:t>‹#›</a:t>
+              <a:t>‹Nr.›</a:t>
             </a:fld>
             <a:endParaRPr lang="en-US"/>
           </a:p>
@@ -1242,7 +1242,7 @@
           <a:p>
             <a:fld id="{2CF66E09-8DBA-E54C-9FBD-9D43ED9CCED6}" type="datetimeFigureOut">
               <a:rPr lang="en-US" smtClean="0"/>
-              <a:t>10/10/16</a:t>
+              <a:t>11/10/16</a:t>
             </a:fld>
             <a:endParaRPr lang="en-US"/>
           </a:p>
@@ -1284,7 +1284,7 @@
           <a:p>
             <a:fld id="{535055C3-FD5C-1945-A94F-F8DDC84A823B}" type="slidenum">
               <a:rPr lang="en-US" smtClean="0"/>
-              <a:t>‹#›</a:t>
+              <a:t>‹Nr.›</a:t>
             </a:fld>
             <a:endParaRPr lang="en-US"/>
           </a:p>
@@ -1609,7 +1609,7 @@
           <a:p>
             <a:fld id="{2CF66E09-8DBA-E54C-9FBD-9D43ED9CCED6}" type="datetimeFigureOut">
               <a:rPr lang="en-US" smtClean="0"/>
-              <a:t>10/10/16</a:t>
+              <a:t>11/10/16</a:t>
             </a:fld>
             <a:endParaRPr lang="en-US"/>
           </a:p>
@@ -1651,7 +1651,7 @@
           <a:p>
             <a:fld id="{535055C3-FD5C-1945-A94F-F8DDC84A823B}" type="slidenum">
               <a:rPr lang="en-US" smtClean="0"/>
-              <a:t>‹#›</a:t>
+              <a:t>‹Nr.›</a:t>
             </a:fld>
             <a:endParaRPr lang="en-US"/>
           </a:p>
@@ -1727,7 +1727,7 @@
           <a:p>
             <a:fld id="{2CF66E09-8DBA-E54C-9FBD-9D43ED9CCED6}" type="datetimeFigureOut">
               <a:rPr lang="en-US" smtClean="0"/>
-              <a:t>10/10/16</a:t>
+              <a:t>11/10/16</a:t>
             </a:fld>
             <a:endParaRPr lang="en-US"/>
           </a:p>
@@ -1769,7 +1769,7 @@
           <a:p>
             <a:fld id="{535055C3-FD5C-1945-A94F-F8DDC84A823B}" type="slidenum">
               <a:rPr lang="en-US" smtClean="0"/>
-              <a:t>‹#›</a:t>
+              <a:t>‹Nr.›</a:t>
             </a:fld>
             <a:endParaRPr lang="en-US"/>
           </a:p>
@@ -1822,7 +1822,7 @@
           <a:p>
             <a:fld id="{2CF66E09-8DBA-E54C-9FBD-9D43ED9CCED6}" type="datetimeFigureOut">
               <a:rPr lang="en-US" smtClean="0"/>
-              <a:t>10/10/16</a:t>
+              <a:t>11/10/16</a:t>
             </a:fld>
             <a:endParaRPr lang="en-US"/>
           </a:p>
@@ -1864,7 +1864,7 @@
           <a:p>
             <a:fld id="{535055C3-FD5C-1945-A94F-F8DDC84A823B}" type="slidenum">
               <a:rPr lang="en-US" smtClean="0"/>
-              <a:t>‹#›</a:t>
+              <a:t>‹Nr.›</a:t>
             </a:fld>
             <a:endParaRPr lang="en-US"/>
           </a:p>
@@ -2099,7 +2099,7 @@
           <a:p>
             <a:fld id="{2CF66E09-8DBA-E54C-9FBD-9D43ED9CCED6}" type="datetimeFigureOut">
               <a:rPr lang="en-US" smtClean="0"/>
-              <a:t>10/10/16</a:t>
+              <a:t>11/10/16</a:t>
             </a:fld>
             <a:endParaRPr lang="en-US"/>
           </a:p>
@@ -2141,7 +2141,7 @@
           <a:p>
             <a:fld id="{535055C3-FD5C-1945-A94F-F8DDC84A823B}" type="slidenum">
               <a:rPr lang="en-US" smtClean="0"/>
-              <a:t>‹#›</a:t>
+              <a:t>‹Nr.›</a:t>
             </a:fld>
             <a:endParaRPr lang="en-US"/>
           </a:p>
@@ -2352,7 +2352,7 @@
           <a:p>
             <a:fld id="{2CF66E09-8DBA-E54C-9FBD-9D43ED9CCED6}" type="datetimeFigureOut">
               <a:rPr lang="en-US" smtClean="0"/>
-              <a:t>10/10/16</a:t>
+              <a:t>11/10/16</a:t>
             </a:fld>
             <a:endParaRPr lang="en-US"/>
           </a:p>
@@ -2394,7 +2394,7 @@
           <a:p>
             <a:fld id="{535055C3-FD5C-1945-A94F-F8DDC84A823B}" type="slidenum">
               <a:rPr lang="en-US" smtClean="0"/>
-              <a:t>‹#›</a:t>
+              <a:t>‹Nr.›</a:t>
             </a:fld>
             <a:endParaRPr lang="en-US"/>
           </a:p>
@@ -2565,7 +2565,7 @@
           <a:p>
             <a:fld id="{2CF66E09-8DBA-E54C-9FBD-9D43ED9CCED6}" type="datetimeFigureOut">
               <a:rPr lang="en-US" smtClean="0"/>
-              <a:t>10/10/16</a:t>
+              <a:t>11/10/16</a:t>
             </a:fld>
             <a:endParaRPr lang="en-US"/>
           </a:p>
@@ -2643,7 +2643,7 @@
           <a:p>
             <a:fld id="{535055C3-FD5C-1945-A94F-F8DDC84A823B}" type="slidenum">
               <a:rPr lang="en-US" smtClean="0"/>
-              <a:t>‹#›</a:t>
+              <a:t>‹Nr.›</a:t>
             </a:fld>
             <a:endParaRPr lang="en-US"/>
           </a:p>
@@ -3039,7 +3039,7 @@
         <p:spPr>
           <a:xfrm>
             <a:off x="5907640" y="2188396"/>
-            <a:ext cx="1794081" cy="369332"/>
+            <a:ext cx="3125023" cy="923330"/>
           </a:xfrm>
           <a:prstGeom prst="rect">
             <a:avLst/>
@@ -3071,6 +3071,20 @@
             <a:r>
               <a:rPr lang="en-US" dirty="0" err="1" smtClean="0"/>
               <a:t>bla</a:t>
+            </a:r>
+            <a:endParaRPr lang="en-US" dirty="0" smtClean="0"/>
+          </a:p>
+          <a:p>
+            <a:endParaRPr lang="en-US" dirty="0"/>
+          </a:p>
+          <a:p>
+            <a:r>
+              <a:rPr lang="en-US" dirty="0" smtClean="0"/>
+              <a:t>This a {^link</a:t>
+            </a:r>
+            <a:r>
+              <a:rPr lang="en-US" smtClean="0"/>
+              <a:t>} inside one xml tag</a:t>
             </a:r>
             <a:endParaRPr lang="en-US" dirty="0"/>
           </a:p>

</xml_diff>

<commit_message>
make the fix working for pptx too
</commit_message>
<xml_diff>
--- a/examples/example-href.pptx
+++ b/examples/example-href.pptx
@@ -244,7 +244,7 @@
           <a:p>
             <a:fld id="{2CF66E09-8DBA-E54C-9FBD-9D43ED9CCED6}" type="datetimeFigureOut">
               <a:rPr lang="en-US" smtClean="0"/>
-              <a:t>10/10/16</a:t>
+              <a:t>11/10/16</a:t>
             </a:fld>
             <a:endParaRPr lang="en-US"/>
           </a:p>
@@ -286,7 +286,7 @@
           <a:p>
             <a:fld id="{535055C3-FD5C-1945-A94F-F8DDC84A823B}" type="slidenum">
               <a:rPr lang="en-US" smtClean="0"/>
-              <a:t>‹#›</a:t>
+              <a:t>‹Nr.›</a:t>
             </a:fld>
             <a:endParaRPr lang="en-US"/>
           </a:p>
@@ -414,7 +414,7 @@
           <a:p>
             <a:fld id="{2CF66E09-8DBA-E54C-9FBD-9D43ED9CCED6}" type="datetimeFigureOut">
               <a:rPr lang="en-US" smtClean="0"/>
-              <a:t>10/10/16</a:t>
+              <a:t>11/10/16</a:t>
             </a:fld>
             <a:endParaRPr lang="en-US"/>
           </a:p>
@@ -456,7 +456,7 @@
           <a:p>
             <a:fld id="{535055C3-FD5C-1945-A94F-F8DDC84A823B}" type="slidenum">
               <a:rPr lang="en-US" smtClean="0"/>
-              <a:t>‹#›</a:t>
+              <a:t>‹Nr.›</a:t>
             </a:fld>
             <a:endParaRPr lang="en-US"/>
           </a:p>
@@ -594,7 +594,7 @@
           <a:p>
             <a:fld id="{2CF66E09-8DBA-E54C-9FBD-9D43ED9CCED6}" type="datetimeFigureOut">
               <a:rPr lang="en-US" smtClean="0"/>
-              <a:t>10/10/16</a:t>
+              <a:t>11/10/16</a:t>
             </a:fld>
             <a:endParaRPr lang="en-US"/>
           </a:p>
@@ -636,7 +636,7 @@
           <a:p>
             <a:fld id="{535055C3-FD5C-1945-A94F-F8DDC84A823B}" type="slidenum">
               <a:rPr lang="en-US" smtClean="0"/>
-              <a:t>‹#›</a:t>
+              <a:t>‹Nr.›</a:t>
             </a:fld>
             <a:endParaRPr lang="en-US"/>
           </a:p>
@@ -764,7 +764,7 @@
           <a:p>
             <a:fld id="{2CF66E09-8DBA-E54C-9FBD-9D43ED9CCED6}" type="datetimeFigureOut">
               <a:rPr lang="en-US" smtClean="0"/>
-              <a:t>10/10/16</a:t>
+              <a:t>11/10/16</a:t>
             </a:fld>
             <a:endParaRPr lang="en-US"/>
           </a:p>
@@ -806,7 +806,7 @@
           <a:p>
             <a:fld id="{535055C3-FD5C-1945-A94F-F8DDC84A823B}" type="slidenum">
               <a:rPr lang="en-US" smtClean="0"/>
-              <a:t>‹#›</a:t>
+              <a:t>‹Nr.›</a:t>
             </a:fld>
             <a:endParaRPr lang="en-US"/>
           </a:p>
@@ -1010,7 +1010,7 @@
           <a:p>
             <a:fld id="{2CF66E09-8DBA-E54C-9FBD-9D43ED9CCED6}" type="datetimeFigureOut">
               <a:rPr lang="en-US" smtClean="0"/>
-              <a:t>10/10/16</a:t>
+              <a:t>11/10/16</a:t>
             </a:fld>
             <a:endParaRPr lang="en-US"/>
           </a:p>
@@ -1052,7 +1052,7 @@
           <a:p>
             <a:fld id="{535055C3-FD5C-1945-A94F-F8DDC84A823B}" type="slidenum">
               <a:rPr lang="en-US" smtClean="0"/>
-              <a:t>‹#›</a:t>
+              <a:t>‹Nr.›</a:t>
             </a:fld>
             <a:endParaRPr lang="en-US"/>
           </a:p>
@@ -1242,7 +1242,7 @@
           <a:p>
             <a:fld id="{2CF66E09-8DBA-E54C-9FBD-9D43ED9CCED6}" type="datetimeFigureOut">
               <a:rPr lang="en-US" smtClean="0"/>
-              <a:t>10/10/16</a:t>
+              <a:t>11/10/16</a:t>
             </a:fld>
             <a:endParaRPr lang="en-US"/>
           </a:p>
@@ -1284,7 +1284,7 @@
           <a:p>
             <a:fld id="{535055C3-FD5C-1945-A94F-F8DDC84A823B}" type="slidenum">
               <a:rPr lang="en-US" smtClean="0"/>
-              <a:t>‹#›</a:t>
+              <a:t>‹Nr.›</a:t>
             </a:fld>
             <a:endParaRPr lang="en-US"/>
           </a:p>
@@ -1609,7 +1609,7 @@
           <a:p>
             <a:fld id="{2CF66E09-8DBA-E54C-9FBD-9D43ED9CCED6}" type="datetimeFigureOut">
               <a:rPr lang="en-US" smtClean="0"/>
-              <a:t>10/10/16</a:t>
+              <a:t>11/10/16</a:t>
             </a:fld>
             <a:endParaRPr lang="en-US"/>
           </a:p>
@@ -1651,7 +1651,7 @@
           <a:p>
             <a:fld id="{535055C3-FD5C-1945-A94F-F8DDC84A823B}" type="slidenum">
               <a:rPr lang="en-US" smtClean="0"/>
-              <a:t>‹#›</a:t>
+              <a:t>‹Nr.›</a:t>
             </a:fld>
             <a:endParaRPr lang="en-US"/>
           </a:p>
@@ -1727,7 +1727,7 @@
           <a:p>
             <a:fld id="{2CF66E09-8DBA-E54C-9FBD-9D43ED9CCED6}" type="datetimeFigureOut">
               <a:rPr lang="en-US" smtClean="0"/>
-              <a:t>10/10/16</a:t>
+              <a:t>11/10/16</a:t>
             </a:fld>
             <a:endParaRPr lang="en-US"/>
           </a:p>
@@ -1769,7 +1769,7 @@
           <a:p>
             <a:fld id="{535055C3-FD5C-1945-A94F-F8DDC84A823B}" type="slidenum">
               <a:rPr lang="en-US" smtClean="0"/>
-              <a:t>‹#›</a:t>
+              <a:t>‹Nr.›</a:t>
             </a:fld>
             <a:endParaRPr lang="en-US"/>
           </a:p>
@@ -1822,7 +1822,7 @@
           <a:p>
             <a:fld id="{2CF66E09-8DBA-E54C-9FBD-9D43ED9CCED6}" type="datetimeFigureOut">
               <a:rPr lang="en-US" smtClean="0"/>
-              <a:t>10/10/16</a:t>
+              <a:t>11/10/16</a:t>
             </a:fld>
             <a:endParaRPr lang="en-US"/>
           </a:p>
@@ -1864,7 +1864,7 @@
           <a:p>
             <a:fld id="{535055C3-FD5C-1945-A94F-F8DDC84A823B}" type="slidenum">
               <a:rPr lang="en-US" smtClean="0"/>
-              <a:t>‹#›</a:t>
+              <a:t>‹Nr.›</a:t>
             </a:fld>
             <a:endParaRPr lang="en-US"/>
           </a:p>
@@ -2099,7 +2099,7 @@
           <a:p>
             <a:fld id="{2CF66E09-8DBA-E54C-9FBD-9D43ED9CCED6}" type="datetimeFigureOut">
               <a:rPr lang="en-US" smtClean="0"/>
-              <a:t>10/10/16</a:t>
+              <a:t>11/10/16</a:t>
             </a:fld>
             <a:endParaRPr lang="en-US"/>
           </a:p>
@@ -2141,7 +2141,7 @@
           <a:p>
             <a:fld id="{535055C3-FD5C-1945-A94F-F8DDC84A823B}" type="slidenum">
               <a:rPr lang="en-US" smtClean="0"/>
-              <a:t>‹#›</a:t>
+              <a:t>‹Nr.›</a:t>
             </a:fld>
             <a:endParaRPr lang="en-US"/>
           </a:p>
@@ -2352,7 +2352,7 @@
           <a:p>
             <a:fld id="{2CF66E09-8DBA-E54C-9FBD-9D43ED9CCED6}" type="datetimeFigureOut">
               <a:rPr lang="en-US" smtClean="0"/>
-              <a:t>10/10/16</a:t>
+              <a:t>11/10/16</a:t>
             </a:fld>
             <a:endParaRPr lang="en-US"/>
           </a:p>
@@ -2394,7 +2394,7 @@
           <a:p>
             <a:fld id="{535055C3-FD5C-1945-A94F-F8DDC84A823B}" type="slidenum">
               <a:rPr lang="en-US" smtClean="0"/>
-              <a:t>‹#›</a:t>
+              <a:t>‹Nr.›</a:t>
             </a:fld>
             <a:endParaRPr lang="en-US"/>
           </a:p>
@@ -2565,7 +2565,7 @@
           <a:p>
             <a:fld id="{2CF66E09-8DBA-E54C-9FBD-9D43ED9CCED6}" type="datetimeFigureOut">
               <a:rPr lang="en-US" smtClean="0"/>
-              <a:t>10/10/16</a:t>
+              <a:t>11/10/16</a:t>
             </a:fld>
             <a:endParaRPr lang="en-US"/>
           </a:p>
@@ -2643,7 +2643,7 @@
           <a:p>
             <a:fld id="{535055C3-FD5C-1945-A94F-F8DDC84A823B}" type="slidenum">
               <a:rPr lang="en-US" smtClean="0"/>
-              <a:t>‹#›</a:t>
+              <a:t>‹Nr.›</a:t>
             </a:fld>
             <a:endParaRPr lang="en-US"/>
           </a:p>
@@ -3038,8 +3038,8 @@
         </p:nvSpPr>
         <p:spPr>
           <a:xfrm>
-            <a:off x="5907640" y="2188396"/>
-            <a:ext cx="1794081" cy="369332"/>
+            <a:off x="3246736" y="2444428"/>
+            <a:ext cx="6326412" cy="923330"/>
           </a:xfrm>
           <a:prstGeom prst="rect">
             <a:avLst/>
@@ -3071,6 +3071,20 @@
             <a:r>
               <a:rPr lang="en-US" dirty="0" err="1" smtClean="0"/>
               <a:t>bla</a:t>
+            </a:r>
+            <a:endParaRPr lang="en-US" dirty="0" smtClean="0"/>
+          </a:p>
+          <a:p>
+            <a:endParaRPr lang="en-US" dirty="0"/>
+          </a:p>
+          <a:p>
+            <a:r>
+              <a:rPr lang="en-US" dirty="0"/>
+              <a:t>Only this {^link} should be replaced, but not the whole sentence!</a:t>
+            </a:r>
+            <a:r>
+              <a:rPr lang="de-DE" dirty="0"/>
+              <a:t> </a:t>
             </a:r>
             <a:endParaRPr lang="en-US" dirty="0"/>
           </a:p>

</xml_diff>

<commit_message>
& was breaking the ppt
</commit_message>
<xml_diff>
--- a/examples/example-href.pptx
+++ b/examples/example-href.pptx
@@ -244,7 +244,7 @@
           <a:p>
             <a:fld id="{2CF66E09-8DBA-E54C-9FBD-9D43ED9CCED6}" type="datetimeFigureOut">
               <a:rPr lang="en-US" smtClean="0"/>
-              <a:t>11/10/16</a:t>
+              <a:t>3/30/17</a:t>
             </a:fld>
             <a:endParaRPr lang="en-US"/>
           </a:p>
@@ -286,7 +286,7 @@
           <a:p>
             <a:fld id="{535055C3-FD5C-1945-A94F-F8DDC84A823B}" type="slidenum">
               <a:rPr lang="en-US" smtClean="0"/>
-              <a:t>‹Nr.›</a:t>
+              <a:t>‹#›</a:t>
             </a:fld>
             <a:endParaRPr lang="en-US"/>
           </a:p>
@@ -414,7 +414,7 @@
           <a:p>
             <a:fld id="{2CF66E09-8DBA-E54C-9FBD-9D43ED9CCED6}" type="datetimeFigureOut">
               <a:rPr lang="en-US" smtClean="0"/>
-              <a:t>11/10/16</a:t>
+              <a:t>3/30/17</a:t>
             </a:fld>
             <a:endParaRPr lang="en-US"/>
           </a:p>
@@ -456,7 +456,7 @@
           <a:p>
             <a:fld id="{535055C3-FD5C-1945-A94F-F8DDC84A823B}" type="slidenum">
               <a:rPr lang="en-US" smtClean="0"/>
-              <a:t>‹Nr.›</a:t>
+              <a:t>‹#›</a:t>
             </a:fld>
             <a:endParaRPr lang="en-US"/>
           </a:p>
@@ -594,7 +594,7 @@
           <a:p>
             <a:fld id="{2CF66E09-8DBA-E54C-9FBD-9D43ED9CCED6}" type="datetimeFigureOut">
               <a:rPr lang="en-US" smtClean="0"/>
-              <a:t>11/10/16</a:t>
+              <a:t>3/30/17</a:t>
             </a:fld>
             <a:endParaRPr lang="en-US"/>
           </a:p>
@@ -636,7 +636,7 @@
           <a:p>
             <a:fld id="{535055C3-FD5C-1945-A94F-F8DDC84A823B}" type="slidenum">
               <a:rPr lang="en-US" smtClean="0"/>
-              <a:t>‹Nr.›</a:t>
+              <a:t>‹#›</a:t>
             </a:fld>
             <a:endParaRPr lang="en-US"/>
           </a:p>
@@ -764,7 +764,7 @@
           <a:p>
             <a:fld id="{2CF66E09-8DBA-E54C-9FBD-9D43ED9CCED6}" type="datetimeFigureOut">
               <a:rPr lang="en-US" smtClean="0"/>
-              <a:t>11/10/16</a:t>
+              <a:t>3/30/17</a:t>
             </a:fld>
             <a:endParaRPr lang="en-US"/>
           </a:p>
@@ -806,7 +806,7 @@
           <a:p>
             <a:fld id="{535055C3-FD5C-1945-A94F-F8DDC84A823B}" type="slidenum">
               <a:rPr lang="en-US" smtClean="0"/>
-              <a:t>‹Nr.›</a:t>
+              <a:t>‹#›</a:t>
             </a:fld>
             <a:endParaRPr lang="en-US"/>
           </a:p>
@@ -1010,7 +1010,7 @@
           <a:p>
             <a:fld id="{2CF66E09-8DBA-E54C-9FBD-9D43ED9CCED6}" type="datetimeFigureOut">
               <a:rPr lang="en-US" smtClean="0"/>
-              <a:t>11/10/16</a:t>
+              <a:t>3/30/17</a:t>
             </a:fld>
             <a:endParaRPr lang="en-US"/>
           </a:p>
@@ -1052,7 +1052,7 @@
           <a:p>
             <a:fld id="{535055C3-FD5C-1945-A94F-F8DDC84A823B}" type="slidenum">
               <a:rPr lang="en-US" smtClean="0"/>
-              <a:t>‹Nr.›</a:t>
+              <a:t>‹#›</a:t>
             </a:fld>
             <a:endParaRPr lang="en-US"/>
           </a:p>
@@ -1242,7 +1242,7 @@
           <a:p>
             <a:fld id="{2CF66E09-8DBA-E54C-9FBD-9D43ED9CCED6}" type="datetimeFigureOut">
               <a:rPr lang="en-US" smtClean="0"/>
-              <a:t>11/10/16</a:t>
+              <a:t>3/30/17</a:t>
             </a:fld>
             <a:endParaRPr lang="en-US"/>
           </a:p>
@@ -1284,7 +1284,7 @@
           <a:p>
             <a:fld id="{535055C3-FD5C-1945-A94F-F8DDC84A823B}" type="slidenum">
               <a:rPr lang="en-US" smtClean="0"/>
-              <a:t>‹Nr.›</a:t>
+              <a:t>‹#›</a:t>
             </a:fld>
             <a:endParaRPr lang="en-US"/>
           </a:p>
@@ -1609,7 +1609,7 @@
           <a:p>
             <a:fld id="{2CF66E09-8DBA-E54C-9FBD-9D43ED9CCED6}" type="datetimeFigureOut">
               <a:rPr lang="en-US" smtClean="0"/>
-              <a:t>11/10/16</a:t>
+              <a:t>3/30/17</a:t>
             </a:fld>
             <a:endParaRPr lang="en-US"/>
           </a:p>
@@ -1651,7 +1651,7 @@
           <a:p>
             <a:fld id="{535055C3-FD5C-1945-A94F-F8DDC84A823B}" type="slidenum">
               <a:rPr lang="en-US" smtClean="0"/>
-              <a:t>‹Nr.›</a:t>
+              <a:t>‹#›</a:t>
             </a:fld>
             <a:endParaRPr lang="en-US"/>
           </a:p>
@@ -1727,7 +1727,7 @@
           <a:p>
             <a:fld id="{2CF66E09-8DBA-E54C-9FBD-9D43ED9CCED6}" type="datetimeFigureOut">
               <a:rPr lang="en-US" smtClean="0"/>
-              <a:t>11/10/16</a:t>
+              <a:t>3/30/17</a:t>
             </a:fld>
             <a:endParaRPr lang="en-US"/>
           </a:p>
@@ -1769,7 +1769,7 @@
           <a:p>
             <a:fld id="{535055C3-FD5C-1945-A94F-F8DDC84A823B}" type="slidenum">
               <a:rPr lang="en-US" smtClean="0"/>
-              <a:t>‹Nr.›</a:t>
+              <a:t>‹#›</a:t>
             </a:fld>
             <a:endParaRPr lang="en-US"/>
           </a:p>
@@ -1822,7 +1822,7 @@
           <a:p>
             <a:fld id="{2CF66E09-8DBA-E54C-9FBD-9D43ED9CCED6}" type="datetimeFigureOut">
               <a:rPr lang="en-US" smtClean="0"/>
-              <a:t>11/10/16</a:t>
+              <a:t>3/30/17</a:t>
             </a:fld>
             <a:endParaRPr lang="en-US"/>
           </a:p>
@@ -1864,7 +1864,7 @@
           <a:p>
             <a:fld id="{535055C3-FD5C-1945-A94F-F8DDC84A823B}" type="slidenum">
               <a:rPr lang="en-US" smtClean="0"/>
-              <a:t>‹Nr.›</a:t>
+              <a:t>‹#›</a:t>
             </a:fld>
             <a:endParaRPr lang="en-US"/>
           </a:p>
@@ -2099,7 +2099,7 @@
           <a:p>
             <a:fld id="{2CF66E09-8DBA-E54C-9FBD-9D43ED9CCED6}" type="datetimeFigureOut">
               <a:rPr lang="en-US" smtClean="0"/>
-              <a:t>11/10/16</a:t>
+              <a:t>3/30/17</a:t>
             </a:fld>
             <a:endParaRPr lang="en-US"/>
           </a:p>
@@ -2141,7 +2141,7 @@
           <a:p>
             <a:fld id="{535055C3-FD5C-1945-A94F-F8DDC84A823B}" type="slidenum">
               <a:rPr lang="en-US" smtClean="0"/>
-              <a:t>‹Nr.›</a:t>
+              <a:t>‹#›</a:t>
             </a:fld>
             <a:endParaRPr lang="en-US"/>
           </a:p>
@@ -2352,7 +2352,7 @@
           <a:p>
             <a:fld id="{2CF66E09-8DBA-E54C-9FBD-9D43ED9CCED6}" type="datetimeFigureOut">
               <a:rPr lang="en-US" smtClean="0"/>
-              <a:t>11/10/16</a:t>
+              <a:t>3/30/17</a:t>
             </a:fld>
             <a:endParaRPr lang="en-US"/>
           </a:p>
@@ -2394,7 +2394,7 @@
           <a:p>
             <a:fld id="{535055C3-FD5C-1945-A94F-F8DDC84A823B}" type="slidenum">
               <a:rPr lang="en-US" smtClean="0"/>
-              <a:t>‹Nr.›</a:t>
+              <a:t>‹#›</a:t>
             </a:fld>
             <a:endParaRPr lang="en-US"/>
           </a:p>
@@ -2565,7 +2565,7 @@
           <a:p>
             <a:fld id="{2CF66E09-8DBA-E54C-9FBD-9D43ED9CCED6}" type="datetimeFigureOut">
               <a:rPr lang="en-US" smtClean="0"/>
-              <a:t>11/10/16</a:t>
+              <a:t>3/30/17</a:t>
             </a:fld>
             <a:endParaRPr lang="en-US"/>
           </a:p>
@@ -2643,7 +2643,7 @@
           <a:p>
             <a:fld id="{535055C3-FD5C-1945-A94F-F8DDC84A823B}" type="slidenum">
               <a:rPr lang="en-US" smtClean="0"/>
-              <a:t>‹Nr.›</a:t>
+              <a:t>‹#›</a:t>
             </a:fld>
             <a:endParaRPr lang="en-US"/>
           </a:p>
@@ -3039,7 +3039,7 @@
         <p:spPr>
           <a:xfrm>
             <a:off x="3246736" y="2444428"/>
-            <a:ext cx="6326412" cy="923330"/>
+            <a:ext cx="6273512" cy="1477328"/>
           </a:xfrm>
           <a:prstGeom prst="rect">
             <a:avLst/>
@@ -3080,11 +3080,32 @@
           <a:p>
             <a:r>
               <a:rPr lang="en-US" dirty="0"/>
-              <a:t>Only this {^link} should be replaced, but not the whole sentence!</a:t>
-            </a:r>
-            <a:r>
-              <a:rPr lang="de-DE" dirty="0"/>
-              <a:t> </a:t>
+              <a:t>Only this {^link} should be replaced, but not the whole sentence</a:t>
+            </a:r>
+            <a:r>
+              <a:rPr lang="en-US" dirty="0" smtClean="0"/>
+              <a:t>!</a:t>
+            </a:r>
+          </a:p>
+          <a:p>
+            <a:endParaRPr lang="en-US" dirty="0"/>
+          </a:p>
+          <a:p>
+            <a:r>
+              <a:rPr lang="en-US" dirty="0" smtClean="0"/>
+              <a:t>Special signs in the link text used to fail</a:t>
+            </a:r>
+            <a:r>
+              <a:rPr lang="de-DE" dirty="0" smtClean="0"/>
+              <a:t> {^</a:t>
+            </a:r>
+            <a:r>
+              <a:rPr lang="de-DE" dirty="0" err="1" smtClean="0"/>
+              <a:t>special_link</a:t>
+            </a:r>
+            <a:r>
+              <a:rPr lang="de-DE" dirty="0" smtClean="0"/>
+              <a:t>}</a:t>
             </a:r>
             <a:endParaRPr lang="en-US" dirty="0"/>
           </a:p>

</xml_diff>